<commit_message>
adding example panel data
</commit_message>
<xml_diff>
--- a/Panel Data .pptx
+++ b/Panel Data .pptx
@@ -254,7 +254,7 @@
           <a:p>
             <a:fld id="{5D40CF0F-AAC8-4054-8C7C-FA14E46F0149}" type="datetimeFigureOut">
               <a:rPr lang="en-US" smtClean="0"/>
-              <a:t>4/7/2024</a:t>
+              <a:t>4/9/2024</a:t>
             </a:fld>
             <a:endParaRPr lang="en-US"/>
           </a:p>
@@ -3793,19 +3793,129 @@
           <a:p>
             <a:r>
               <a:rPr lang="en-US" dirty="0"/>
-              <a:t>Economic data: GDP, unemployment rates, and inflation rates of different countries over several years.</a:t>
-            </a:r>
-          </a:p>
-          <a:p>
+              <a:t>Economic data: </a:t>
+            </a:r>
+            <a:r>
+              <a:rPr lang="en-US" dirty="0">
+                <a:solidFill>
+                  <a:srgbClr val="92D050"/>
+                </a:solidFill>
+              </a:rPr>
+              <a:t>GDP, unemployment rates, and inflation</a:t>
+            </a:r>
             <a:r>
               <a:rPr lang="en-US" dirty="0"/>
-              <a:t>Medical data: Patient health metrics observed across multiple visits.</a:t>
-            </a:r>
-          </a:p>
-          <a:p>
+              <a:t> </a:t>
+            </a:r>
+            <a:r>
+              <a:rPr lang="en-US" dirty="0">
+                <a:solidFill>
+                  <a:srgbClr val="92D050"/>
+                </a:solidFill>
+              </a:rPr>
+              <a:t>rates</a:t>
+            </a:r>
             <a:r>
               <a:rPr lang="en-US" dirty="0"/>
-              <a:t>Social science data: Surveys on social behavior or opinions conducted over years across different demographic groups.</a:t>
+              <a:t> of different </a:t>
+            </a:r>
+            <a:r>
+              <a:rPr lang="en-US" dirty="0">
+                <a:solidFill>
+                  <a:schemeClr val="accent1"/>
+                </a:solidFill>
+              </a:rPr>
+              <a:t>countries</a:t>
+            </a:r>
+            <a:r>
+              <a:rPr lang="en-US" dirty="0"/>
+              <a:t> over </a:t>
+            </a:r>
+            <a:r>
+              <a:rPr lang="en-US" dirty="0">
+                <a:solidFill>
+                  <a:schemeClr val="bg2">
+                    <a:lumMod val="75000"/>
+                  </a:schemeClr>
+                </a:solidFill>
+              </a:rPr>
+              <a:t>several years.</a:t>
+            </a:r>
+          </a:p>
+          <a:p>
+            <a:r>
+              <a:rPr lang="en-US" dirty="0"/>
+              <a:t>Medical data: </a:t>
+            </a:r>
+            <a:r>
+              <a:rPr lang="en-US" dirty="0">
+                <a:solidFill>
+                  <a:schemeClr val="accent1"/>
+                </a:solidFill>
+              </a:rPr>
+              <a:t>Patient</a:t>
+            </a:r>
+            <a:r>
+              <a:rPr lang="en-US" dirty="0"/>
+              <a:t> </a:t>
+            </a:r>
+            <a:r>
+              <a:rPr lang="en-US" dirty="0">
+                <a:solidFill>
+                  <a:srgbClr val="92D050"/>
+                </a:solidFill>
+              </a:rPr>
+              <a:t>health metrics </a:t>
+            </a:r>
+            <a:r>
+              <a:rPr lang="en-US" dirty="0"/>
+              <a:t>observed </a:t>
+            </a:r>
+            <a:r>
+              <a:rPr lang="en-US" dirty="0">
+                <a:solidFill>
+                  <a:schemeClr val="bg2"/>
+                </a:solidFill>
+              </a:rPr>
+              <a:t>across multiple visits.</a:t>
+            </a:r>
+          </a:p>
+          <a:p>
+            <a:r>
+              <a:rPr lang="en-US" dirty="0"/>
+              <a:t>Social science data: </a:t>
+            </a:r>
+            <a:r>
+              <a:rPr lang="en-US" dirty="0">
+                <a:solidFill>
+                  <a:srgbClr val="92D050"/>
+                </a:solidFill>
+              </a:rPr>
+              <a:t>Surveys on social behavior or opinions</a:t>
+            </a:r>
+            <a:r>
+              <a:rPr lang="en-US" dirty="0"/>
+              <a:t> conducted over </a:t>
+            </a:r>
+            <a:r>
+              <a:rPr lang="en-US" dirty="0">
+                <a:solidFill>
+                  <a:schemeClr val="bg2"/>
+                </a:solidFill>
+              </a:rPr>
+              <a:t>years</a:t>
+            </a:r>
+            <a:r>
+              <a:rPr lang="en-US" dirty="0"/>
+              <a:t> across </a:t>
+            </a:r>
+            <a:r>
+              <a:rPr lang="en-US" dirty="0">
+                <a:solidFill>
+                  <a:schemeClr val="accent1"/>
+                </a:solidFill>
+              </a:rPr>
+              <a:t>different demographic groups.</a:t>
             </a:r>
           </a:p>
         </p:txBody>

</xml_diff>